<commit_message>
Completed presentation for Systems group.
</commit_message>
<xml_diff>
--- a/Presentation.pptx
+++ b/Presentation.pptx
@@ -4097,7 +4097,7 @@
         <p:spPr/>
         <p:txBody>
           <a:bodyPr>
-            <a:normAutofit fontScale="85000" lnSpcReduction="10000"/>
+            <a:normAutofit fontScale="92500" lnSpcReduction="20000"/>
           </a:bodyPr>
           <a:lstStyle/>
           <a:p>
@@ -4141,7 +4141,11 @@
           <a:p>
             <a:r>
               <a:rPr lang="en-GB" dirty="0" smtClean="0"/>
-              <a:t>Simulations in </a:t>
+              <a:t>Run simulations </a:t>
+            </a:r>
+            <a:r>
+              <a:rPr lang="en-GB" dirty="0" smtClean="0"/>
+              <a:t>in </a:t>
             </a:r>
             <a:r>
               <a:rPr lang="en-GB" dirty="0" err="1" smtClean="0"/>
@@ -4149,11 +4153,11 @@
             </a:r>
             <a:r>
               <a:rPr lang="en-GB" dirty="0" smtClean="0"/>
-              <a:t> socio-technical agent oriented simulation </a:t>
+              <a:t> </a:t>
             </a:r>
             <a:r>
               <a:rPr lang="en-GB" dirty="0" smtClean="0"/>
-              <a:t>environment to observe emergent behaviour</a:t>
+              <a:t>simulation framework and observe emergent behaviour</a:t>
             </a:r>
             <a:endParaRPr lang="en-GB" dirty="0" smtClean="0"/>
           </a:p>
@@ -4411,31 +4415,59 @@
           <a:p>
             <a:r>
               <a:rPr lang="en-GB" dirty="0" smtClean="0"/>
-              <a:t>Domain Model</a:t>
+              <a:t>Domain </a:t>
+            </a:r>
+            <a:r>
+              <a:rPr lang="en-GB" dirty="0" smtClean="0"/>
+              <a:t>Model (The ‘Physics’)</a:t>
             </a:r>
             <a:endParaRPr lang="en-GB" dirty="0"/>
           </a:p>
         </p:txBody>
       </p:sp>
-      <p:sp>
-        <p:nvSpPr>
-          <p:cNvPr id="3" name="Content Placeholder 2"/>
-          <p:cNvSpPr>
-            <a:spLocks noGrp="1"/>
-          </p:cNvSpPr>
+      <p:pic>
+        <p:nvPicPr>
+          <p:cNvPr id="5" name="Picture 2" descr="C:\Users\Tim\Desktop\full-class-diagram-1.jpg"/>
+          <p:cNvPicPr>
+            <a:picLocks noGrp="1" noChangeAspect="1" noChangeArrowheads="1"/>
+          </p:cNvPicPr>
           <p:nvPr>
             <p:ph idx="1"/>
           </p:nvPr>
-        </p:nvSpPr>
-        <p:spPr/>
-        <p:txBody>
-          <a:bodyPr/>
-          <a:lstStyle/>
-          <a:p>
-            <a:endParaRPr lang="en-GB" dirty="0"/>
-          </a:p>
-        </p:txBody>
-      </p:sp>
+        </p:nvPicPr>
+        <p:blipFill>
+          <a:blip r:embed="rId2">
+            <a:extLst>
+              <a:ext uri="{28A0092B-C50C-407E-A947-70E740481C1C}">
+                <a14:useLocalDpi xmlns:a14="http://schemas.microsoft.com/office/drawing/2010/main" val="0"/>
+              </a:ext>
+            </a:extLst>
+          </a:blip>
+          <a:srcRect/>
+          <a:stretch>
+            <a:fillRect/>
+          </a:stretch>
+        </p:blipFill>
+        <p:spPr bwMode="auto">
+          <a:xfrm>
+            <a:off x="1600200" y="1409118"/>
+            <a:ext cx="6281166" cy="4718878"/>
+          </a:xfrm>
+          <a:prstGeom prst="rect">
+            <a:avLst/>
+          </a:prstGeom>
+          <a:noFill/>
+          <a:extLst>
+            <a:ext uri="{909E8E84-426E-40DD-AFC4-6F175D3DCCD1}">
+              <a14:hiddenFill xmlns:a14="http://schemas.microsoft.com/office/drawing/2010/main">
+                <a:solidFill>
+                  <a:srgbClr val="FFFFFF"/>
+                </a:solidFill>
+              </a14:hiddenFill>
+            </a:ext>
+          </a:extLst>
+        </p:spPr>
+      </p:pic>
     </p:spTree>
     <p:extLst>
       <p:ext uri="{BB962C8B-B14F-4D97-AF65-F5344CB8AC3E}">
@@ -7334,7 +7366,7 @@
         <p:spPr/>
         <p:txBody>
           <a:bodyPr>
-            <a:normAutofit fontScale="85000" lnSpcReduction="10000"/>
+            <a:normAutofit fontScale="70000" lnSpcReduction="20000"/>
           </a:bodyPr>
           <a:lstStyle/>
           <a:p>
@@ -7359,8 +7391,20 @@
           <a:p>
             <a:r>
               <a:rPr lang="en-GB" dirty="0" smtClean="0"/>
-              <a:t>Actors execute a workflow until a cost is encountered</a:t>
-            </a:r>
+              <a:t>Actors execute a workflow until a cost is </a:t>
+            </a:r>
+            <a:r>
+              <a:rPr lang="en-GB" dirty="0" smtClean="0"/>
+              <a:t>encountered</a:t>
+            </a:r>
+          </a:p>
+          <a:p>
+            <a:pPr lvl="1"/>
+            <a:r>
+              <a:rPr lang="en-GB" dirty="0" smtClean="0"/>
+              <a:t>Tasks are passed as workflow instance method references and arguments</a:t>
+            </a:r>
+            <a:endParaRPr lang="en-GB" dirty="0" smtClean="0"/>
           </a:p>
           <a:p>
             <a:pPr lvl="1"/>
@@ -7385,8 +7429,20 @@
             </a:r>
             <a:r>
               <a:rPr lang="en-GB" dirty="0"/>
-              <a:t>for one tick if no work to do</a:t>
-            </a:r>
+              <a:t>for one tick if no work to </a:t>
+            </a:r>
+            <a:r>
+              <a:rPr lang="en-GB" dirty="0" smtClean="0"/>
+              <a:t>do</a:t>
+            </a:r>
+          </a:p>
+          <a:p>
+            <a:pPr lvl="1"/>
+            <a:r>
+              <a:rPr lang="en-GB" dirty="0" smtClean="0"/>
+              <a:t>Actors can allocate each other tasks</a:t>
+            </a:r>
+            <a:endParaRPr lang="en-GB" dirty="0"/>
           </a:p>
         </p:txBody>
       </p:sp>
@@ -7398,7 +7454,7 @@
         </p:nvGrpSpPr>
         <p:grpSpPr>
           <a:xfrm>
-            <a:off x="5872235" y="3300402"/>
+            <a:off x="5643635" y="3733800"/>
             <a:ext cx="1143000" cy="1143000"/>
             <a:chOff x="6248400" y="3714750"/>
             <a:chExt cx="1143000" cy="1143000"/>
@@ -7969,7 +8025,7 @@
         </p:nvCxnSpPr>
         <p:spPr>
           <a:xfrm>
-            <a:off x="5181600" y="4300717"/>
+            <a:off x="4953000" y="4734115"/>
             <a:ext cx="0" cy="676085"/>
           </a:xfrm>
           <a:prstGeom prst="line">
@@ -7999,7 +8055,7 @@
         </p:nvCxnSpPr>
         <p:spPr>
           <a:xfrm>
-            <a:off x="5181600" y="4976802"/>
+            <a:off x="4953000" y="5410200"/>
             <a:ext cx="304800" cy="533400"/>
           </a:xfrm>
           <a:prstGeom prst="line">
@@ -8029,7 +8085,7 @@
         </p:nvCxnSpPr>
         <p:spPr>
           <a:xfrm>
-            <a:off x="4800600" y="4519602"/>
+            <a:off x="4572000" y="4953000"/>
             <a:ext cx="685800" cy="0"/>
           </a:xfrm>
           <a:prstGeom prst="line">
@@ -8059,7 +8115,7 @@
         </p:nvSpPr>
         <p:spPr>
           <a:xfrm>
-            <a:off x="5029200" y="3986202"/>
+            <a:off x="4800600" y="4419600"/>
             <a:ext cx="304800" cy="303565"/>
           </a:xfrm>
           <a:prstGeom prst="ellipse">
@@ -8099,7 +8155,7 @@
         </p:nvCxnSpPr>
         <p:spPr>
           <a:xfrm flipH="1">
-            <a:off x="4953000" y="4976802"/>
+            <a:off x="4724400" y="5410200"/>
             <a:ext cx="228600" cy="533400"/>
           </a:xfrm>
           <a:prstGeom prst="line">
@@ -8129,7 +8185,7 @@
         </p:nvCxnSpPr>
         <p:spPr>
           <a:xfrm>
-            <a:off x="8077200" y="3767317"/>
+            <a:off x="7848600" y="4200715"/>
             <a:ext cx="0" cy="676085"/>
           </a:xfrm>
           <a:prstGeom prst="line">
@@ -8159,7 +8215,7 @@
         </p:nvCxnSpPr>
         <p:spPr>
           <a:xfrm>
-            <a:off x="8077200" y="4443402"/>
+            <a:off x="7848600" y="4876800"/>
             <a:ext cx="304800" cy="533400"/>
           </a:xfrm>
           <a:prstGeom prst="line">
@@ -8189,7 +8245,7 @@
         </p:nvCxnSpPr>
         <p:spPr>
           <a:xfrm>
-            <a:off x="7696200" y="3986202"/>
+            <a:off x="7467600" y="4419600"/>
             <a:ext cx="685800" cy="0"/>
           </a:xfrm>
           <a:prstGeom prst="line">
@@ -8219,7 +8275,7 @@
         </p:nvSpPr>
         <p:spPr>
           <a:xfrm>
-            <a:off x="7924800" y="3452802"/>
+            <a:off x="7696200" y="3886200"/>
             <a:ext cx="304800" cy="303565"/>
           </a:xfrm>
           <a:prstGeom prst="ellipse">
@@ -8259,7 +8315,7 @@
         </p:nvCxnSpPr>
         <p:spPr>
           <a:xfrm flipH="1">
-            <a:off x="7848600" y="4443402"/>
+            <a:off x="7620000" y="4876800"/>
             <a:ext cx="228600" cy="533400"/>
           </a:xfrm>
           <a:prstGeom prst="line">
@@ -8289,7 +8345,7 @@
         </p:nvCxnSpPr>
         <p:spPr>
           <a:xfrm>
-            <a:off x="5486400" y="2295715"/>
+            <a:off x="5257800" y="2729113"/>
             <a:ext cx="0" cy="676085"/>
           </a:xfrm>
           <a:prstGeom prst="line">
@@ -8319,7 +8375,7 @@
         </p:nvCxnSpPr>
         <p:spPr>
           <a:xfrm>
-            <a:off x="5486400" y="2971800"/>
+            <a:off x="5257800" y="3405198"/>
             <a:ext cx="304800" cy="533400"/>
           </a:xfrm>
           <a:prstGeom prst="line">
@@ -8349,7 +8405,7 @@
         </p:nvCxnSpPr>
         <p:spPr>
           <a:xfrm>
-            <a:off x="5105400" y="2514600"/>
+            <a:off x="4876800" y="2947998"/>
             <a:ext cx="685800" cy="0"/>
           </a:xfrm>
           <a:prstGeom prst="line">
@@ -8379,7 +8435,7 @@
         </p:nvSpPr>
         <p:spPr>
           <a:xfrm>
-            <a:off x="5334000" y="1981200"/>
+            <a:off x="5105400" y="2414598"/>
             <a:ext cx="304800" cy="303565"/>
           </a:xfrm>
           <a:prstGeom prst="ellipse">
@@ -8419,7 +8475,7 @@
         </p:nvCxnSpPr>
         <p:spPr>
           <a:xfrm flipH="1">
-            <a:off x="5257800" y="2971800"/>
+            <a:off x="5029200" y="3405198"/>
             <a:ext cx="228600" cy="533400"/>
           </a:xfrm>
           <a:prstGeom prst="line">
@@ -8449,7 +8505,7 @@
         </p:nvCxnSpPr>
         <p:spPr>
           <a:xfrm flipH="1" flipV="1">
-            <a:off x="7086600" y="4086460"/>
+            <a:off x="6858000" y="4519858"/>
             <a:ext cx="609600" cy="12040"/>
           </a:xfrm>
           <a:prstGeom prst="straightConnector1">
@@ -8483,7 +8539,7 @@
         </p:nvCxnSpPr>
         <p:spPr>
           <a:xfrm>
-            <a:off x="5791200" y="2971800"/>
+            <a:off x="5562600" y="3405198"/>
             <a:ext cx="260706" cy="404802"/>
           </a:xfrm>
           <a:prstGeom prst="straightConnector1">
@@ -8517,7 +8573,7 @@
         </p:nvCxnSpPr>
         <p:spPr>
           <a:xfrm flipV="1">
-            <a:off x="5486400" y="4352742"/>
+            <a:off x="5257800" y="4786140"/>
             <a:ext cx="462036" cy="357360"/>
           </a:xfrm>
           <a:prstGeom prst="straightConnector1">
@@ -8551,7 +8607,7 @@
         </p:nvSpPr>
         <p:spPr>
           <a:xfrm>
-            <a:off x="6348485" y="1295400"/>
+            <a:off x="6119885" y="1728798"/>
             <a:ext cx="666750" cy="533400"/>
           </a:xfrm>
           <a:prstGeom prst="rect">
@@ -8591,7 +8647,7 @@
         </p:nvSpPr>
         <p:spPr>
           <a:xfrm>
-            <a:off x="7924800" y="1447800"/>
+            <a:off x="7696200" y="1881198"/>
             <a:ext cx="914400" cy="685182"/>
           </a:xfrm>
           <a:prstGeom prst="rect">
@@ -8631,7 +8687,7 @@
         </p:nvSpPr>
         <p:spPr>
           <a:xfrm>
-            <a:off x="6905526" y="2438400"/>
+            <a:off x="6676926" y="2871798"/>
             <a:ext cx="714474" cy="609600"/>
           </a:xfrm>
           <a:prstGeom prst="rect">
@@ -8673,7 +8729,7 @@
         </p:nvCxnSpPr>
         <p:spPr>
           <a:xfrm flipV="1">
-            <a:off x="5638800" y="1562100"/>
+            <a:off x="5410200" y="1995498"/>
             <a:ext cx="709685" cy="342900"/>
           </a:xfrm>
           <a:prstGeom prst="straightConnector1">
@@ -8708,7 +8764,7 @@
         </p:nvCxnSpPr>
         <p:spPr>
           <a:xfrm>
-            <a:off x="6821218" y="1905000"/>
+            <a:off x="6592618" y="2338398"/>
             <a:ext cx="441545" cy="533400"/>
           </a:xfrm>
           <a:prstGeom prst="straightConnector1">
@@ -8744,7 +8800,7 @@
         </p:nvCxnSpPr>
         <p:spPr>
           <a:xfrm flipV="1">
-            <a:off x="7620000" y="2132982"/>
+            <a:off x="7391400" y="2566380"/>
             <a:ext cx="762000" cy="610218"/>
           </a:xfrm>
           <a:prstGeom prst="straightConnector1">
@@ -8777,7 +8833,7 @@
         </p:nvCxnSpPr>
         <p:spPr>
           <a:xfrm flipV="1">
-            <a:off x="8382000" y="2132982"/>
+            <a:off x="8153400" y="2566380"/>
             <a:ext cx="228600" cy="1358716"/>
           </a:xfrm>
           <a:prstGeom prst="straightConnector1">
@@ -10046,8 +10102,19 @@
         </p:nvSpPr>
         <p:spPr/>
         <p:txBody>
-          <a:bodyPr/>
+          <a:bodyPr>
+            <a:normAutofit lnSpcReduction="10000"/>
+          </a:bodyPr>
           <a:lstStyle/>
+          <a:p>
+            <a:pPr marL="0" indent="0">
+              <a:buNone/>
+            </a:pPr>
+            <a:r>
+              <a:rPr lang="en-GB" dirty="0" smtClean="0"/>
+              <a:t>This talk</a:t>
+            </a:r>
+          </a:p>
           <a:p>
             <a:r>
               <a:rPr lang="en-GB" dirty="0" smtClean="0"/>
@@ -10075,9 +10142,44 @@
           </a:p>
           <a:p>
             <a:r>
+              <a:rPr lang="en-GB" dirty="0">
+                <a:hlinkClick r:id="rId3"/>
+              </a:rPr>
+              <a:t>http://</a:t>
+            </a:r>
+            <a:r>
+              <a:rPr lang="en-GB" dirty="0" smtClean="0">
+                <a:hlinkClick r:id="rId3"/>
+              </a:rPr>
+              <a:t>github.com/twsswt/softdev-workflow</a:t>
+            </a:r>
+            <a:endParaRPr lang="en-GB" dirty="0" smtClean="0"/>
+          </a:p>
+          <a:p>
+            <a:endParaRPr lang="en-GB" dirty="0" smtClean="0"/>
+          </a:p>
+          <a:p>
+            <a:pPr marL="0" indent="0">
+              <a:buNone/>
+            </a:pPr>
+            <a:r>
+              <a:rPr lang="en-GB" dirty="0" smtClean="0"/>
+              <a:t>Another Theatre Demo:</a:t>
+            </a:r>
+            <a:endParaRPr lang="en-GB" dirty="0"/>
+          </a:p>
+          <a:p>
+            <a:r>
+              <a:rPr lang="en-GB" dirty="0" smtClean="0"/>
+              <a:t>http</a:t>
+            </a:r>
+            <a:r>
               <a:rPr lang="en-GB" dirty="0"/>
-              <a:t>http://github.com/twsswt/softdev-workflow</a:t>
-            </a:r>
+              <a:t>://github.com/twsswt/pyagora</a:t>
+            </a:r>
+          </a:p>
+          <a:p>
+            <a:endParaRPr lang="en-GB" dirty="0"/>
           </a:p>
           <a:p>
             <a:endParaRPr lang="en-GB" dirty="0"/>
@@ -15645,7 +15747,7 @@
           <a:p>
             <a:r>
               <a:rPr lang="en-GB" dirty="0" smtClean="0"/>
-              <a:t>Contributions</a:t>
+              <a:t>Summary</a:t>
             </a:r>
             <a:endParaRPr lang="en-GB" dirty="0"/>
           </a:p>
@@ -15721,8 +15823,16 @@
               <a:t>Fuzzi</a:t>
             </a:r>
             <a:r>
-              <a:rPr lang="en-GB" smtClean="0"/>
-              <a:t> Moss)</a:t>
+              <a:rPr lang="en-GB" dirty="0" err="1"/>
+              <a:t>_</a:t>
+            </a:r>
+            <a:r>
+              <a:rPr lang="en-GB" dirty="0" err="1" smtClean="0"/>
+              <a:t>Moss</a:t>
+            </a:r>
+            <a:r>
+              <a:rPr lang="en-GB" dirty="0" smtClean="0"/>
+              <a:t>)</a:t>
             </a:r>
             <a:endParaRPr lang="en-GB" dirty="0" smtClean="0"/>
           </a:p>
@@ -15799,7 +15909,7 @@
           <a:p>
             <a:r>
               <a:rPr lang="en-GB" dirty="0" smtClean="0"/>
-              <a:t>Thanks!</a:t>
+              <a:t>Thanks! (and Questions)</a:t>
             </a:r>
             <a:endParaRPr lang="en-GB" dirty="0"/>
           </a:p>

</xml_diff>